<commit_message>
Minor change to the Unit test slides
</commit_message>
<xml_diff>
--- a/Presentations/DeveloperInduction/Concept Discussion - Unit Tests and Mocking.pptx
+++ b/Presentations/DeveloperInduction/Concept Discussion - Unit Tests and Mocking.pptx
@@ -10345,8 +10345,12 @@
           <a:lstStyle/>
           <a:p>
             <a:r>
+              <a:rPr lang="en-GB" dirty="0" smtClean="0"/>
+              <a:t>The most important </a:t>
+            </a:r>
+            <a:r>
               <a:rPr lang="en-GB" dirty="0"/>
-              <a:t>Don’t worry about how long it takes to run your unit tests. The important thing is that we have good quality tests, which provide a large amount of coverage!</a:t>
+              <a:t>thing is that we have good quality tests, which provide a large amount of coverage!</a:t>
             </a:r>
           </a:p>
           <a:p>

</xml_diff>